<commit_message>
added aravinda slides and Day 2 slides
</commit_message>
<xml_diff>
--- a/2014_07_23/DataManagement.pptx
+++ b/2014_07_23/DataManagement.pptx
@@ -207,7 +207,7 @@
           <a:p>
             <a:fld id="{5EA87592-5D9E-DE4F-8106-C3F97ACF2B82}" type="datetimeFigureOut">
               <a:rPr lang="en-US" smtClean="0"/>
-              <a:t>7/16/14</a:t>
+              <a:t>7/18/14</a:t>
             </a:fld>
             <a:endParaRPr lang="en-US"/>
           </a:p>
@@ -670,7 +670,7 @@
           <a:p>
             <a:fld id="{7CE38E4D-051A-41E1-86A4-E56916468FD0}" type="datetimeFigureOut">
               <a:rPr lang="en-US" smtClean="0"/>
-              <a:t>7/16/14</a:t>
+              <a:t>7/18/14</a:t>
             </a:fld>
             <a:endParaRPr lang="en-US"/>
           </a:p>
@@ -880,7 +880,7 @@
           <a:p>
             <a:fld id="{7CE38E4D-051A-41E1-86A4-E56916468FD0}" type="datetimeFigureOut">
               <a:rPr lang="en-US" smtClean="0"/>
-              <a:t>7/16/14</a:t>
+              <a:t>7/18/14</a:t>
             </a:fld>
             <a:endParaRPr lang="en-US"/>
           </a:p>
@@ -1090,7 +1090,7 @@
           <a:p>
             <a:fld id="{7CE38E4D-051A-41E1-86A4-E56916468FD0}" type="datetimeFigureOut">
               <a:rPr lang="en-US" smtClean="0"/>
-              <a:t>7/16/14</a:t>
+              <a:t>7/18/14</a:t>
             </a:fld>
             <a:endParaRPr lang="en-US"/>
           </a:p>
@@ -1348,7 +1348,7 @@
           <a:p>
             <a:fld id="{054C2DA1-236E-C842-BFBF-1DF383B94297}" type="datetimeFigureOut">
               <a:rPr lang="en-US" smtClean="0"/>
-              <a:t>7/16/14</a:t>
+              <a:t>7/18/14</a:t>
             </a:fld>
             <a:endParaRPr lang="en-US"/>
           </a:p>
@@ -1443,7 +1443,7 @@
           <a:p>
             <a:fld id="{054C2DA1-236E-C842-BFBF-1DF383B94297}" type="datetimeFigureOut">
               <a:rPr lang="en-US" smtClean="0"/>
-              <a:t>7/16/14</a:t>
+              <a:t>7/18/14</a:t>
             </a:fld>
             <a:endParaRPr lang="en-US"/>
           </a:p>
@@ -1689,7 +1689,7 @@
           <a:p>
             <a:fld id="{054C2DA1-236E-C842-BFBF-1DF383B94297}" type="datetimeFigureOut">
               <a:rPr lang="en-US" smtClean="0"/>
-              <a:t>7/16/14</a:t>
+              <a:t>7/18/14</a:t>
             </a:fld>
             <a:endParaRPr lang="en-US"/>
           </a:p>
@@ -1977,7 +1977,7 @@
           <a:p>
             <a:fld id="{054C2DA1-236E-C842-BFBF-1DF383B94297}" type="datetimeFigureOut">
               <a:rPr lang="en-US" smtClean="0"/>
-              <a:t>7/16/14</a:t>
+              <a:t>7/18/14</a:t>
             </a:fld>
             <a:endParaRPr lang="en-US"/>
           </a:p>
@@ -2399,7 +2399,7 @@
           <a:p>
             <a:fld id="{054C2DA1-236E-C842-BFBF-1DF383B94297}" type="datetimeFigureOut">
               <a:rPr lang="en-US" smtClean="0"/>
-              <a:t>7/16/14</a:t>
+              <a:t>7/18/14</a:t>
             </a:fld>
             <a:endParaRPr lang="en-US"/>
           </a:p>
@@ -2517,7 +2517,7 @@
           <a:p>
             <a:fld id="{054C2DA1-236E-C842-BFBF-1DF383B94297}" type="datetimeFigureOut">
               <a:rPr lang="en-US" smtClean="0"/>
-              <a:t>7/16/14</a:t>
+              <a:t>7/18/14</a:t>
             </a:fld>
             <a:endParaRPr lang="en-US"/>
           </a:p>
@@ -2612,7 +2612,7 @@
           <a:p>
             <a:fld id="{054C2DA1-236E-C842-BFBF-1DF383B94297}" type="datetimeFigureOut">
               <a:rPr lang="en-US" smtClean="0"/>
-              <a:t>7/16/14</a:t>
+              <a:t>7/18/14</a:t>
             </a:fld>
             <a:endParaRPr lang="en-US"/>
           </a:p>
@@ -2889,7 +2889,7 @@
           <a:p>
             <a:fld id="{054C2DA1-236E-C842-BFBF-1DF383B94297}" type="datetimeFigureOut">
               <a:rPr lang="en-US" smtClean="0"/>
-              <a:t>7/16/14</a:t>
+              <a:t>7/18/14</a:t>
             </a:fld>
             <a:endParaRPr lang="en-US"/>
           </a:p>
@@ -3083,7 +3083,7 @@
           <a:p>
             <a:fld id="{7CE38E4D-051A-41E1-86A4-E56916468FD0}" type="datetimeFigureOut">
               <a:rPr lang="en-US" smtClean="0"/>
-              <a:t>7/16/14</a:t>
+              <a:t>7/18/14</a:t>
             </a:fld>
             <a:endParaRPr lang="en-US"/>
           </a:p>
@@ -3352,7 +3352,7 @@
           <a:p>
             <a:fld id="{054C2DA1-236E-C842-BFBF-1DF383B94297}" type="datetimeFigureOut">
               <a:rPr lang="en-US" smtClean="0"/>
-              <a:t>7/16/14</a:t>
+              <a:t>7/18/14</a:t>
             </a:fld>
             <a:endParaRPr lang="en-US"/>
           </a:p>
@@ -3522,7 +3522,7 @@
           <a:p>
             <a:fld id="{054C2DA1-236E-C842-BFBF-1DF383B94297}" type="datetimeFigureOut">
               <a:rPr lang="en-US" smtClean="0"/>
-              <a:t>7/16/14</a:t>
+              <a:t>7/18/14</a:t>
             </a:fld>
             <a:endParaRPr lang="en-US"/>
           </a:p>
@@ -3702,7 +3702,7 @@
           <a:p>
             <a:fld id="{054C2DA1-236E-C842-BFBF-1DF383B94297}" type="datetimeFigureOut">
               <a:rPr lang="en-US" smtClean="0"/>
-              <a:t>7/16/14</a:t>
+              <a:t>7/18/14</a:t>
             </a:fld>
             <a:endParaRPr lang="en-US"/>
           </a:p>
@@ -3962,7 +3962,7 @@
           <a:p>
             <a:fld id="{7CE38E4D-051A-41E1-86A4-E56916468FD0}" type="datetimeFigureOut">
               <a:rPr lang="en-US" smtClean="0"/>
-              <a:t>7/16/14</a:t>
+              <a:t>7/18/14</a:t>
             </a:fld>
             <a:endParaRPr lang="en-US"/>
           </a:p>
@@ -4288,7 +4288,7 @@
           <a:p>
             <a:fld id="{7CE38E4D-051A-41E1-86A4-E56916468FD0}" type="datetimeFigureOut">
               <a:rPr lang="en-US" smtClean="0"/>
-              <a:t>7/16/14</a:t>
+              <a:t>7/18/14</a:t>
             </a:fld>
             <a:endParaRPr lang="en-US"/>
           </a:p>
@@ -4754,7 +4754,7 @@
           <a:p>
             <a:fld id="{7CE38E4D-051A-41E1-86A4-E56916468FD0}" type="datetimeFigureOut">
               <a:rPr lang="en-US" smtClean="0"/>
-              <a:t>7/16/14</a:t>
+              <a:t>7/18/14</a:t>
             </a:fld>
             <a:endParaRPr lang="en-US"/>
           </a:p>
@@ -4904,7 +4904,7 @@
           <a:p>
             <a:fld id="{7CE38E4D-051A-41E1-86A4-E56916468FD0}" type="datetimeFigureOut">
               <a:rPr lang="en-US" smtClean="0"/>
-              <a:t>7/16/14</a:t>
+              <a:t>7/18/14</a:t>
             </a:fld>
             <a:endParaRPr lang="en-US"/>
           </a:p>
@@ -5023,42 +5023,12 @@
           <a:p>
             <a:fld id="{7CE38E4D-051A-41E1-86A4-E56916468FD0}" type="datetimeFigureOut">
               <a:rPr lang="en-US" smtClean="0"/>
-              <a:t>7/16/14</a:t>
+              <a:t>7/18/14</a:t>
             </a:fld>
             <a:endParaRPr lang="en-US"/>
           </a:p>
         </p:txBody>
       </p:sp>
-      <p:pic>
-        <p:nvPicPr>
-          <p:cNvPr id="5" name="Picture 4"/>
-          <p:cNvPicPr>
-            <a:picLocks noChangeAspect="1"/>
-          </p:cNvPicPr>
-          <p:nvPr userDrawn="1"/>
-        </p:nvPicPr>
-        <p:blipFill>
-          <a:blip r:embed="rId2">
-            <a:extLst>
-              <a:ext uri="{28A0092B-C50C-407E-A947-70E740481C1C}">
-                <a14:useLocalDpi xmlns:a14="http://schemas.microsoft.com/office/drawing/2010/main" val="0"/>
-              </a:ext>
-            </a:extLst>
-          </a:blip>
-          <a:stretch>
-            <a:fillRect/>
-          </a:stretch>
-        </p:blipFill>
-        <p:spPr>
-          <a:xfrm>
-            <a:off x="6905093" y="5941081"/>
-            <a:ext cx="2550014" cy="1275007"/>
-          </a:xfrm>
-          <a:prstGeom prst="rect">
-            <a:avLst/>
-          </a:prstGeom>
-        </p:spPr>
-      </p:pic>
     </p:spTree>
     <p:extLst>
       <p:ext uri="{BB962C8B-B14F-4D97-AF65-F5344CB8AC3E}">
@@ -5305,7 +5275,7 @@
           <a:p>
             <a:fld id="{7CE38E4D-051A-41E1-86A4-E56916468FD0}" type="datetimeFigureOut">
               <a:rPr lang="en-US" smtClean="0"/>
-              <a:t>7/16/14</a:t>
+              <a:t>7/18/14</a:t>
             </a:fld>
             <a:endParaRPr lang="en-US"/>
           </a:p>
@@ -5595,7 +5565,7 @@
           <a:p>
             <a:fld id="{7CE38E4D-051A-41E1-86A4-E56916468FD0}" type="datetimeFigureOut">
               <a:rPr lang="en-US" smtClean="0"/>
-              <a:t>7/16/14</a:t>
+              <a:t>7/18/14</a:t>
             </a:fld>
             <a:endParaRPr lang="en-US"/>
           </a:p>
@@ -6120,7 +6090,7 @@
           <a:p>
             <a:fld id="{054C2DA1-236E-C842-BFBF-1DF383B94297}" type="datetimeFigureOut">
               <a:rPr lang="en-US" smtClean="0"/>
-              <a:t>7/16/14</a:t>
+              <a:t>7/18/14</a:t>
             </a:fld>
             <a:endParaRPr lang="en-US"/>
           </a:p>
@@ -6675,11 +6645,7 @@
           <a:p>
             <a:r>
               <a:rPr lang="en-US" dirty="0" smtClean="0"/>
-              <a:t>Short Course in Medical Genetics </a:t>
-            </a:r>
-            <a:r>
-              <a:rPr lang="en-US" dirty="0" smtClean="0"/>
-              <a:t>2014</a:t>
+              <a:t>Short Course in Medical Genetics 2014</a:t>
             </a:r>
             <a:endParaRPr lang="en-US" dirty="0"/>
           </a:p>
@@ -6707,8 +6673,8 @@
         </p:blipFill>
         <p:spPr>
           <a:xfrm>
-            <a:off x="0" y="-152400"/>
-            <a:ext cx="3200400" cy="1600200"/>
+            <a:off x="2393593" y="3232666"/>
+            <a:ext cx="4155989" cy="2077995"/>
           </a:xfrm>
           <a:prstGeom prst="rect">
             <a:avLst/>
@@ -8659,38 +8625,14 @@
           <a:p>
             <a:r>
               <a:rPr lang="en-US" sz="2800" dirty="0" smtClean="0"/>
-              <a:t>Deanna Church </a:t>
-            </a:r>
-            <a:r>
-              <a:rPr lang="en-US" sz="2800" dirty="0" smtClean="0"/>
-              <a:t>works </a:t>
-            </a:r>
-            <a:r>
-              <a:rPr lang="en-US" sz="2800" dirty="0" smtClean="0"/>
-              <a:t>for Personalis, Inc. A company that </a:t>
-            </a:r>
-            <a:r>
-              <a:rPr lang="en-US" sz="2800" dirty="0" smtClean="0"/>
-              <a:t/>
+              <a:t>Deanna Church works for Personalis, Inc. A company that </a:t>
             </a:r>
             <a:br>
               <a:rPr lang="en-US" sz="2800" dirty="0" smtClean="0"/>
             </a:br>
             <a:r>
               <a:rPr lang="en-US" sz="2800" dirty="0" smtClean="0"/>
-              <a:t>provides </a:t>
-            </a:r>
-            <a:r>
-              <a:rPr lang="en-US" sz="2800" dirty="0" smtClean="0"/>
-              <a:t>whole </a:t>
-            </a:r>
-            <a:r>
-              <a:rPr lang="en-US" sz="2800" dirty="0" smtClean="0"/>
-              <a:t>genome </a:t>
-            </a:r>
-            <a:r>
-              <a:rPr lang="en-US" sz="2800" dirty="0" smtClean="0"/>
-              <a:t>and whole </a:t>
+              <a:t>provides whole genome and whole </a:t>
             </a:r>
             <a:r>
               <a:rPr lang="en-US" sz="2800" dirty="0" err="1" smtClean="0"/>
@@ -8709,11 +8651,7 @@
             </a:br>
             <a:r>
               <a:rPr lang="en-US" sz="2800" dirty="0" smtClean="0"/>
-              <a:t>analysis </a:t>
-            </a:r>
-            <a:r>
-              <a:rPr lang="en-US" sz="2800" dirty="0" smtClean="0"/>
-              <a:t>services. </a:t>
+              <a:t>analysis services. </a:t>
             </a:r>
             <a:endParaRPr lang="en-US" sz="2800" dirty="0"/>
           </a:p>

</xml_diff>

<commit_message>
Finalized Day 2 lecture and exercises
</commit_message>
<xml_diff>
--- a/2014_07_23/DataManagement.pptx
+++ b/2014_07_23/DataManagement.pptx
@@ -6,24 +6,26 @@
     <p:sldMasterId id="2147483742" r:id="rId2"/>
   </p:sldMasterIdLst>
   <p:notesMasterIdLst>
-    <p:notesMasterId r:id="rId18"/>
+    <p:notesMasterId r:id="rId20"/>
   </p:notesMasterIdLst>
   <p:sldIdLst>
     <p:sldId id="256" r:id="rId3"/>
     <p:sldId id="271" r:id="rId4"/>
     <p:sldId id="257" r:id="rId5"/>
-    <p:sldId id="259" r:id="rId6"/>
-    <p:sldId id="260" r:id="rId7"/>
-    <p:sldId id="261" r:id="rId8"/>
-    <p:sldId id="262" r:id="rId9"/>
-    <p:sldId id="263" r:id="rId10"/>
-    <p:sldId id="265" r:id="rId11"/>
-    <p:sldId id="264" r:id="rId12"/>
-    <p:sldId id="266" r:id="rId13"/>
-    <p:sldId id="267" r:id="rId14"/>
-    <p:sldId id="268" r:id="rId15"/>
-    <p:sldId id="269" r:id="rId16"/>
-    <p:sldId id="270" r:id="rId17"/>
+    <p:sldId id="272" r:id="rId6"/>
+    <p:sldId id="259" r:id="rId7"/>
+    <p:sldId id="260" r:id="rId8"/>
+    <p:sldId id="261" r:id="rId9"/>
+    <p:sldId id="262" r:id="rId10"/>
+    <p:sldId id="263" r:id="rId11"/>
+    <p:sldId id="273" r:id="rId12"/>
+    <p:sldId id="265" r:id="rId13"/>
+    <p:sldId id="264" r:id="rId14"/>
+    <p:sldId id="266" r:id="rId15"/>
+    <p:sldId id="267" r:id="rId16"/>
+    <p:sldId id="268" r:id="rId17"/>
+    <p:sldId id="269" r:id="rId18"/>
+    <p:sldId id="270" r:id="rId19"/>
   </p:sldIdLst>
   <p:sldSz cx="9144000" cy="6858000" type="screen4x3"/>
   <p:notesSz cx="6858000" cy="9144000"/>
@@ -207,7 +209,7 @@
           <a:p>
             <a:fld id="{5EA87592-5D9E-DE4F-8106-C3F97ACF2B82}" type="datetimeFigureOut">
               <a:rPr lang="en-US" smtClean="0"/>
-              <a:t>7/18/14</a:t>
+              <a:t>7/22/14</a:t>
             </a:fld>
             <a:endParaRPr lang="en-US"/>
           </a:p>
@@ -670,7 +672,7 @@
           <a:p>
             <a:fld id="{7CE38E4D-051A-41E1-86A4-E56916468FD0}" type="datetimeFigureOut">
               <a:rPr lang="en-US" smtClean="0"/>
-              <a:t>7/18/14</a:t>
+              <a:t>7/22/14</a:t>
             </a:fld>
             <a:endParaRPr lang="en-US"/>
           </a:p>
@@ -880,7 +882,7 @@
           <a:p>
             <a:fld id="{7CE38E4D-051A-41E1-86A4-E56916468FD0}" type="datetimeFigureOut">
               <a:rPr lang="en-US" smtClean="0"/>
-              <a:t>7/18/14</a:t>
+              <a:t>7/22/14</a:t>
             </a:fld>
             <a:endParaRPr lang="en-US"/>
           </a:p>
@@ -1090,7 +1092,7 @@
           <a:p>
             <a:fld id="{7CE38E4D-051A-41E1-86A4-E56916468FD0}" type="datetimeFigureOut">
               <a:rPr lang="en-US" smtClean="0"/>
-              <a:t>7/18/14</a:t>
+              <a:t>7/22/14</a:t>
             </a:fld>
             <a:endParaRPr lang="en-US"/>
           </a:p>
@@ -1348,7 +1350,7 @@
           <a:p>
             <a:fld id="{054C2DA1-236E-C842-BFBF-1DF383B94297}" type="datetimeFigureOut">
               <a:rPr lang="en-US" smtClean="0"/>
-              <a:t>7/18/14</a:t>
+              <a:t>7/22/14</a:t>
             </a:fld>
             <a:endParaRPr lang="en-US"/>
           </a:p>
@@ -1443,7 +1445,7 @@
           <a:p>
             <a:fld id="{054C2DA1-236E-C842-BFBF-1DF383B94297}" type="datetimeFigureOut">
               <a:rPr lang="en-US" smtClean="0"/>
-              <a:t>7/18/14</a:t>
+              <a:t>7/22/14</a:t>
             </a:fld>
             <a:endParaRPr lang="en-US"/>
           </a:p>
@@ -1689,7 +1691,7 @@
           <a:p>
             <a:fld id="{054C2DA1-236E-C842-BFBF-1DF383B94297}" type="datetimeFigureOut">
               <a:rPr lang="en-US" smtClean="0"/>
-              <a:t>7/18/14</a:t>
+              <a:t>7/22/14</a:t>
             </a:fld>
             <a:endParaRPr lang="en-US"/>
           </a:p>
@@ -1977,7 +1979,7 @@
           <a:p>
             <a:fld id="{054C2DA1-236E-C842-BFBF-1DF383B94297}" type="datetimeFigureOut">
               <a:rPr lang="en-US" smtClean="0"/>
-              <a:t>7/18/14</a:t>
+              <a:t>7/22/14</a:t>
             </a:fld>
             <a:endParaRPr lang="en-US"/>
           </a:p>
@@ -2399,7 +2401,7 @@
           <a:p>
             <a:fld id="{054C2DA1-236E-C842-BFBF-1DF383B94297}" type="datetimeFigureOut">
               <a:rPr lang="en-US" smtClean="0"/>
-              <a:t>7/18/14</a:t>
+              <a:t>7/22/14</a:t>
             </a:fld>
             <a:endParaRPr lang="en-US"/>
           </a:p>
@@ -2517,7 +2519,7 @@
           <a:p>
             <a:fld id="{054C2DA1-236E-C842-BFBF-1DF383B94297}" type="datetimeFigureOut">
               <a:rPr lang="en-US" smtClean="0"/>
-              <a:t>7/18/14</a:t>
+              <a:t>7/22/14</a:t>
             </a:fld>
             <a:endParaRPr lang="en-US"/>
           </a:p>
@@ -2612,7 +2614,7 @@
           <a:p>
             <a:fld id="{054C2DA1-236E-C842-BFBF-1DF383B94297}" type="datetimeFigureOut">
               <a:rPr lang="en-US" smtClean="0"/>
-              <a:t>7/18/14</a:t>
+              <a:t>7/22/14</a:t>
             </a:fld>
             <a:endParaRPr lang="en-US"/>
           </a:p>
@@ -2889,7 +2891,7 @@
           <a:p>
             <a:fld id="{054C2DA1-236E-C842-BFBF-1DF383B94297}" type="datetimeFigureOut">
               <a:rPr lang="en-US" smtClean="0"/>
-              <a:t>7/18/14</a:t>
+              <a:t>7/22/14</a:t>
             </a:fld>
             <a:endParaRPr lang="en-US"/>
           </a:p>
@@ -3083,7 +3085,7 @@
           <a:p>
             <a:fld id="{7CE38E4D-051A-41E1-86A4-E56916468FD0}" type="datetimeFigureOut">
               <a:rPr lang="en-US" smtClean="0"/>
-              <a:t>7/18/14</a:t>
+              <a:t>7/22/14</a:t>
             </a:fld>
             <a:endParaRPr lang="en-US"/>
           </a:p>
@@ -3352,7 +3354,7 @@
           <a:p>
             <a:fld id="{054C2DA1-236E-C842-BFBF-1DF383B94297}" type="datetimeFigureOut">
               <a:rPr lang="en-US" smtClean="0"/>
-              <a:t>7/18/14</a:t>
+              <a:t>7/22/14</a:t>
             </a:fld>
             <a:endParaRPr lang="en-US"/>
           </a:p>
@@ -3522,7 +3524,7 @@
           <a:p>
             <a:fld id="{054C2DA1-236E-C842-BFBF-1DF383B94297}" type="datetimeFigureOut">
               <a:rPr lang="en-US" smtClean="0"/>
-              <a:t>7/18/14</a:t>
+              <a:t>7/22/14</a:t>
             </a:fld>
             <a:endParaRPr lang="en-US"/>
           </a:p>
@@ -3702,7 +3704,7 @@
           <a:p>
             <a:fld id="{054C2DA1-236E-C842-BFBF-1DF383B94297}" type="datetimeFigureOut">
               <a:rPr lang="en-US" smtClean="0"/>
-              <a:t>7/18/14</a:t>
+              <a:t>7/22/14</a:t>
             </a:fld>
             <a:endParaRPr lang="en-US"/>
           </a:p>
@@ -3962,7 +3964,7 @@
           <a:p>
             <a:fld id="{7CE38E4D-051A-41E1-86A4-E56916468FD0}" type="datetimeFigureOut">
               <a:rPr lang="en-US" smtClean="0"/>
-              <a:t>7/18/14</a:t>
+              <a:t>7/22/14</a:t>
             </a:fld>
             <a:endParaRPr lang="en-US"/>
           </a:p>
@@ -4288,7 +4290,7 @@
           <a:p>
             <a:fld id="{7CE38E4D-051A-41E1-86A4-E56916468FD0}" type="datetimeFigureOut">
               <a:rPr lang="en-US" smtClean="0"/>
-              <a:t>7/18/14</a:t>
+              <a:t>7/22/14</a:t>
             </a:fld>
             <a:endParaRPr lang="en-US"/>
           </a:p>
@@ -4754,7 +4756,7 @@
           <a:p>
             <a:fld id="{7CE38E4D-051A-41E1-86A4-E56916468FD0}" type="datetimeFigureOut">
               <a:rPr lang="en-US" smtClean="0"/>
-              <a:t>7/18/14</a:t>
+              <a:t>7/22/14</a:t>
             </a:fld>
             <a:endParaRPr lang="en-US"/>
           </a:p>
@@ -4904,7 +4906,7 @@
           <a:p>
             <a:fld id="{7CE38E4D-051A-41E1-86A4-E56916468FD0}" type="datetimeFigureOut">
               <a:rPr lang="en-US" smtClean="0"/>
-              <a:t>7/18/14</a:t>
+              <a:t>7/22/14</a:t>
             </a:fld>
             <a:endParaRPr lang="en-US"/>
           </a:p>
@@ -5023,7 +5025,7 @@
           <a:p>
             <a:fld id="{7CE38E4D-051A-41E1-86A4-E56916468FD0}" type="datetimeFigureOut">
               <a:rPr lang="en-US" smtClean="0"/>
-              <a:t>7/18/14</a:t>
+              <a:t>7/22/14</a:t>
             </a:fld>
             <a:endParaRPr lang="en-US"/>
           </a:p>
@@ -5275,7 +5277,7 @@
           <a:p>
             <a:fld id="{7CE38E4D-051A-41E1-86A4-E56916468FD0}" type="datetimeFigureOut">
               <a:rPr lang="en-US" smtClean="0"/>
-              <a:t>7/18/14</a:t>
+              <a:t>7/22/14</a:t>
             </a:fld>
             <a:endParaRPr lang="en-US"/>
           </a:p>
@@ -5565,7 +5567,7 @@
           <a:p>
             <a:fld id="{7CE38E4D-051A-41E1-86A4-E56916468FD0}" type="datetimeFigureOut">
               <a:rPr lang="en-US" smtClean="0"/>
-              <a:t>7/18/14</a:t>
+              <a:t>7/22/14</a:t>
             </a:fld>
             <a:endParaRPr lang="en-US"/>
           </a:p>
@@ -6090,7 +6092,7 @@
           <a:p>
             <a:fld id="{054C2DA1-236E-C842-BFBF-1DF383B94297}" type="datetimeFigureOut">
               <a:rPr lang="en-US" smtClean="0"/>
-              <a:t>7/18/14</a:t>
+              <a:t>7/22/14</a:t>
             </a:fld>
             <a:endParaRPr lang="en-US"/>
           </a:p>
@@ -6726,7 +6728,7 @@
         </p:nvSpPr>
         <p:spPr>
           <a:xfrm>
-            <a:off x="-25658" y="-56378"/>
+            <a:off x="-25658" y="-43550"/>
             <a:ext cx="7931303" cy="646331"/>
           </a:xfrm>
           <a:prstGeom prst="rect">
@@ -6760,28 +6762,22 @@
       </p:sp>
       <p:pic>
         <p:nvPicPr>
-          <p:cNvPr id="4" name="Picture 3" descr="BWAGit.png"/>
+          <p:cNvPr id="3" name="Picture 2"/>
           <p:cNvPicPr>
             <a:picLocks noChangeAspect="1"/>
           </p:cNvPicPr>
           <p:nvPr/>
         </p:nvPicPr>
         <p:blipFill>
-          <a:blip r:embed="rId2">
-            <a:extLst>
-              <a:ext uri="{28A0092B-C50C-407E-A947-70E740481C1C}">
-                <a14:useLocalDpi xmlns:a14="http://schemas.microsoft.com/office/drawing/2010/main" val="0"/>
-              </a:ext>
-            </a:extLst>
-          </a:blip>
+          <a:blip r:embed="rId2"/>
           <a:stretch>
             <a:fillRect/>
           </a:stretch>
         </p:blipFill>
         <p:spPr>
           <a:xfrm>
-            <a:off x="0" y="1333977"/>
-            <a:ext cx="9144000" cy="5148082"/>
+            <a:off x="831965" y="1508235"/>
+            <a:ext cx="7733697" cy="3610010"/>
           </a:xfrm>
           <a:prstGeom prst="rect">
             <a:avLst/>
@@ -6790,14 +6786,14 @@
       </p:pic>
       <p:sp>
         <p:nvSpPr>
-          <p:cNvPr id="5" name="TextBox 4"/>
+          <p:cNvPr id="4" name="TextBox 3"/>
           <p:cNvSpPr txBox="1"/>
           <p:nvPr/>
         </p:nvSpPr>
         <p:spPr>
           <a:xfrm>
-            <a:off x="38490" y="6503635"/>
-            <a:ext cx="2835181" cy="369332"/>
+            <a:off x="218096" y="674789"/>
+            <a:ext cx="613870" cy="523220"/>
           </a:xfrm>
           <a:prstGeom prst="rect">
             <a:avLst/>
@@ -6811,83 +6807,81 @@
           <a:lstStyle/>
           <a:p>
             <a:r>
-              <a:rPr lang="en-US" dirty="0" smtClean="0">
+              <a:rPr lang="en-US" sz="2800" dirty="0" err="1" smtClean="0"/>
+              <a:t>Git</a:t>
+            </a:r>
+            <a:endParaRPr lang="en-US" sz="2800" dirty="0"/>
+          </a:p>
+        </p:txBody>
+      </p:sp>
+      <p:sp>
+        <p:nvSpPr>
+          <p:cNvPr id="5" name="Rectangle 4"/>
+          <p:cNvSpPr/>
+          <p:nvPr/>
+        </p:nvSpPr>
+        <p:spPr>
+          <a:xfrm>
+            <a:off x="0" y="6463012"/>
+            <a:ext cx="3980577" cy="400110"/>
+          </a:xfrm>
+          <a:prstGeom prst="rect">
+            <a:avLst/>
+          </a:prstGeom>
+        </p:spPr>
+        <p:txBody>
+          <a:bodyPr wrap="none">
+            <a:spAutoFit/>
+          </a:bodyPr>
+          <a:lstStyle/>
+          <a:p>
+            <a:r>
+              <a:rPr lang="en-US" sz="2000" dirty="0">
                 <a:solidFill>
-                  <a:srgbClr val="595959"/>
+                  <a:srgbClr val="0000FF"/>
                 </a:solidFill>
               </a:rPr>
-              <a:t>https://</a:t>
-            </a:r>
-            <a:r>
-              <a:rPr lang="en-US" dirty="0" err="1" smtClean="0">
+              <a:t>http://</a:t>
+            </a:r>
+            <a:r>
+              <a:rPr lang="en-US" sz="2000" dirty="0" err="1">
                 <a:solidFill>
-                  <a:srgbClr val="595959"/>
+                  <a:srgbClr val="0000FF"/>
                 </a:solidFill>
               </a:rPr>
-              <a:t>github.com</a:t>
-            </a:r>
-            <a:r>
-              <a:rPr lang="en-US" dirty="0" smtClean="0">
+              <a:t>nyuccl.org</a:t>
+            </a:r>
+            <a:r>
+              <a:rPr lang="en-US" sz="2000" dirty="0">
                 <a:solidFill>
-                  <a:srgbClr val="595959"/>
+                  <a:srgbClr val="0000FF"/>
                 </a:solidFill>
               </a:rPr>
-              <a:t>/lh3/</a:t>
-            </a:r>
-            <a:r>
-              <a:rPr lang="en-US" dirty="0" err="1" smtClean="0">
+              <a:t>/pages/</a:t>
+            </a:r>
+            <a:r>
+              <a:rPr lang="en-US" sz="2000" dirty="0" err="1">
                 <a:solidFill>
-                  <a:srgbClr val="595959"/>
+                  <a:srgbClr val="0000FF"/>
                 </a:solidFill>
               </a:rPr>
-              <a:t>bwa</a:t>
-            </a:r>
-            <a:endParaRPr lang="en-US" dirty="0">
-              <a:solidFill>
-                <a:srgbClr val="595959"/>
-              </a:solidFill>
-            </a:endParaRPr>
-          </a:p>
-        </p:txBody>
-      </p:sp>
-      <p:sp>
-        <p:nvSpPr>
-          <p:cNvPr id="6" name="TextBox 5"/>
-          <p:cNvSpPr txBox="1"/>
-          <p:nvPr/>
-        </p:nvSpPr>
-        <p:spPr>
-          <a:xfrm>
-            <a:off x="12831" y="718342"/>
-            <a:ext cx="2538801" cy="523220"/>
-          </a:xfrm>
-          <a:prstGeom prst="rect">
-            <a:avLst/>
-          </a:prstGeom>
-          <a:noFill/>
-        </p:spPr>
-        <p:txBody>
-          <a:bodyPr wrap="none" rtlCol="0">
-            <a:spAutoFit/>
-          </a:bodyPr>
-          <a:lstStyle/>
-          <a:p>
-            <a:r>
-              <a:rPr lang="en-US" sz="2800" dirty="0" err="1" smtClean="0"/>
-              <a:t>GitHub</a:t>
-            </a:r>
-            <a:r>
-              <a:rPr lang="en-US" sz="2800" dirty="0" smtClean="0"/>
-              <a:t> example</a:t>
-            </a:r>
-            <a:endParaRPr lang="en-US" sz="2800" dirty="0"/>
+              <a:t>GitTutorial</a:t>
+            </a:r>
+            <a:r>
+              <a:rPr lang="en-US" sz="2000" dirty="0">
+                <a:solidFill>
+                  <a:srgbClr val="0000FF"/>
+                </a:solidFill>
+              </a:rPr>
+              <a:t>/</a:t>
+            </a:r>
           </a:p>
         </p:txBody>
       </p:sp>
     </p:spTree>
     <p:extLst>
       <p:ext uri="{BB962C8B-B14F-4D97-AF65-F5344CB8AC3E}">
-        <p14:creationId xmlns:p14="http://schemas.microsoft.com/office/powerpoint/2010/main" val="4100079500"/>
+        <p14:creationId xmlns:p14="http://schemas.microsoft.com/office/powerpoint/2010/main" val="1395633162"/>
       </p:ext>
     </p:extLst>
   </p:cSld>
@@ -6914,83 +6908,9 @@
           <a:chExt cx="0" cy="0"/>
         </a:xfrm>
       </p:grpSpPr>
-      <p:sp>
-        <p:nvSpPr>
-          <p:cNvPr id="2" name="TextBox 1"/>
-          <p:cNvSpPr txBox="1"/>
-          <p:nvPr/>
-        </p:nvSpPr>
-        <p:spPr>
-          <a:xfrm>
-            <a:off x="-25658" y="-82034"/>
-            <a:ext cx="4574991" cy="646331"/>
-          </a:xfrm>
-          <a:prstGeom prst="rect">
-            <a:avLst/>
-          </a:prstGeom>
-          <a:noFill/>
-        </p:spPr>
-        <p:txBody>
-          <a:bodyPr wrap="none" rtlCol="0">
-            <a:spAutoFit/>
-          </a:bodyPr>
-          <a:lstStyle/>
-          <a:p>
-            <a:r>
-              <a:rPr lang="en-US" sz="3600" dirty="0" smtClean="0">
-                <a:solidFill>
-                  <a:srgbClr val="008000"/>
-                </a:solidFill>
-                <a:latin typeface="+mj-lt"/>
-              </a:rPr>
-              <a:t>Data citing and sharing</a:t>
-            </a:r>
-            <a:endParaRPr lang="en-US" sz="3600" dirty="0">
-              <a:solidFill>
-                <a:srgbClr val="008000"/>
-              </a:solidFill>
-              <a:latin typeface="+mj-lt"/>
-            </a:endParaRPr>
-          </a:p>
-        </p:txBody>
-      </p:sp>
-      <p:sp>
-        <p:nvSpPr>
-          <p:cNvPr id="3" name="TextBox 2"/>
-          <p:cNvSpPr txBox="1"/>
-          <p:nvPr/>
-        </p:nvSpPr>
-        <p:spPr>
-          <a:xfrm>
-            <a:off x="-25656" y="756826"/>
-            <a:ext cx="2729909" cy="523220"/>
-          </a:xfrm>
-          <a:prstGeom prst="rect">
-            <a:avLst/>
-          </a:prstGeom>
-          <a:noFill/>
-        </p:spPr>
-        <p:txBody>
-          <a:bodyPr wrap="none" rtlCol="0">
-            <a:spAutoFit/>
-          </a:bodyPr>
-          <a:lstStyle/>
-          <a:p>
-            <a:r>
-              <a:rPr lang="en-US" sz="2800" dirty="0" err="1" smtClean="0"/>
-              <a:t>Figshare</a:t>
-            </a:r>
-            <a:r>
-              <a:rPr lang="en-US" sz="2800" dirty="0" smtClean="0"/>
-              <a:t> example</a:t>
-            </a:r>
-            <a:endParaRPr lang="en-US" sz="2800" dirty="0"/>
-          </a:p>
-        </p:txBody>
-      </p:sp>
       <p:pic>
         <p:nvPicPr>
-          <p:cNvPr id="4" name="Picture 3" descr="FigshareHome.png"/>
+          <p:cNvPr id="2" name="Picture 1" descr="HengLiGit.png"/>
           <p:cNvPicPr>
             <a:picLocks noChangeAspect="1"/>
           </p:cNvPicPr>
@@ -7010,8 +6930,8 @@
         </p:blipFill>
         <p:spPr>
           <a:xfrm>
-            <a:off x="12831" y="1267218"/>
-            <a:ext cx="9144000" cy="5274849"/>
+            <a:off x="0" y="1056020"/>
+            <a:ext cx="9144000" cy="5119389"/>
           </a:xfrm>
           <a:prstGeom prst="rect">
             <a:avLst/>
@@ -7020,14 +6940,14 @@
       </p:pic>
       <p:sp>
         <p:nvSpPr>
-          <p:cNvPr id="5" name="TextBox 4"/>
+          <p:cNvPr id="3" name="TextBox 2"/>
           <p:cNvSpPr txBox="1"/>
           <p:nvPr/>
         </p:nvSpPr>
         <p:spPr>
           <a:xfrm>
-            <a:off x="38490" y="6503635"/>
-            <a:ext cx="2755607" cy="369332"/>
+            <a:off x="0" y="6501496"/>
+            <a:ext cx="2108670" cy="338554"/>
           </a:xfrm>
           <a:prstGeom prst="rect">
             <a:avLst/>
@@ -7041,7 +6961,7 @@
           <a:lstStyle/>
           <a:p>
             <a:r>
-              <a:rPr lang="en-US" dirty="0" smtClean="0">
+              <a:rPr lang="en-US" sz="1600" dirty="0" smtClean="0">
                 <a:solidFill>
                   <a:srgbClr val="595959"/>
                 </a:solidFill>
@@ -7049,22 +6969,22 @@
               <a:t>https://</a:t>
             </a:r>
             <a:r>
-              <a:rPr lang="en-US" dirty="0" err="1" smtClean="0">
+              <a:rPr lang="en-US" sz="1600" dirty="0" err="1" smtClean="0">
                 <a:solidFill>
                   <a:srgbClr val="595959"/>
                 </a:solidFill>
               </a:rPr>
-              <a:t>figshare.com</a:t>
-            </a:r>
-            <a:r>
-              <a:rPr lang="en-US" dirty="0" smtClean="0">
+              <a:t>github.com</a:t>
+            </a:r>
+            <a:r>
+              <a:rPr lang="en-US" sz="1600" dirty="0" smtClean="0">
                 <a:solidFill>
                   <a:srgbClr val="595959"/>
                 </a:solidFill>
               </a:rPr>
-              <a:t>/about</a:t>
-            </a:r>
-            <a:endParaRPr lang="en-US" dirty="0">
+              <a:t>/lh3</a:t>
+            </a:r>
+            <a:endParaRPr lang="en-US" sz="1600" dirty="0">
               <a:solidFill>
                 <a:srgbClr val="595959"/>
               </a:solidFill>
@@ -7072,10 +6992,127 @@
           </a:p>
         </p:txBody>
       </p:sp>
+      <p:sp>
+        <p:nvSpPr>
+          <p:cNvPr id="4" name="TextBox 3"/>
+          <p:cNvSpPr txBox="1"/>
+          <p:nvPr/>
+        </p:nvSpPr>
+        <p:spPr>
+          <a:xfrm>
+            <a:off x="-25658" y="-82034"/>
+            <a:ext cx="6501675" cy="646331"/>
+          </a:xfrm>
+          <a:prstGeom prst="rect">
+            <a:avLst/>
+          </a:prstGeom>
+          <a:noFill/>
+        </p:spPr>
+        <p:txBody>
+          <a:bodyPr wrap="none" rtlCol="0">
+            <a:spAutoFit/>
+          </a:bodyPr>
+          <a:lstStyle/>
+          <a:p>
+            <a:r>
+              <a:rPr lang="en-US" sz="3600" dirty="0" smtClean="0">
+                <a:solidFill>
+                  <a:srgbClr val="008000"/>
+                </a:solidFill>
+                <a:latin typeface="+mj-lt"/>
+              </a:rPr>
+              <a:t>Getting a handle on data: </a:t>
+            </a:r>
+            <a:r>
+              <a:rPr lang="en-US" sz="3600" dirty="0" smtClean="0">
+                <a:solidFill>
+                  <a:srgbClr val="008000"/>
+                </a:solidFill>
+                <a:latin typeface="+mj-lt"/>
+              </a:rPr>
+              <a:t>socially</a:t>
+            </a:r>
+            <a:endParaRPr lang="en-US" sz="3600" dirty="0">
+              <a:solidFill>
+                <a:srgbClr val="008000"/>
+              </a:solidFill>
+              <a:latin typeface="+mj-lt"/>
+            </a:endParaRPr>
+          </a:p>
+        </p:txBody>
+      </p:sp>
+      <p:sp>
+        <p:nvSpPr>
+          <p:cNvPr id="5" name="TextBox 4"/>
+          <p:cNvSpPr txBox="1"/>
+          <p:nvPr/>
+        </p:nvSpPr>
+        <p:spPr>
+          <a:xfrm>
+            <a:off x="12831" y="513094"/>
+            <a:ext cx="2538801" cy="523220"/>
+          </a:xfrm>
+          <a:prstGeom prst="rect">
+            <a:avLst/>
+          </a:prstGeom>
+          <a:noFill/>
+        </p:spPr>
+        <p:txBody>
+          <a:bodyPr wrap="none" rtlCol="0">
+            <a:spAutoFit/>
+          </a:bodyPr>
+          <a:lstStyle/>
+          <a:p>
+            <a:r>
+              <a:rPr lang="en-US" sz="2800" dirty="0" err="1" smtClean="0"/>
+              <a:t>GitHub</a:t>
+            </a:r>
+            <a:r>
+              <a:rPr lang="en-US" sz="2800" dirty="0" smtClean="0"/>
+              <a:t> example</a:t>
+            </a:r>
+            <a:endParaRPr lang="en-US" sz="2800" dirty="0"/>
+          </a:p>
+        </p:txBody>
+      </p:sp>
+      <p:sp>
+        <p:nvSpPr>
+          <p:cNvPr id="6" name="TextBox 5"/>
+          <p:cNvSpPr txBox="1"/>
+          <p:nvPr/>
+        </p:nvSpPr>
+        <p:spPr>
+          <a:xfrm>
+            <a:off x="6036714" y="6406626"/>
+            <a:ext cx="3120115" cy="461665"/>
+          </a:xfrm>
+          <a:prstGeom prst="rect">
+            <a:avLst/>
+          </a:prstGeom>
+          <a:noFill/>
+        </p:spPr>
+        <p:txBody>
+          <a:bodyPr wrap="none" rtlCol="0">
+            <a:spAutoFit/>
+          </a:bodyPr>
+          <a:lstStyle/>
+          <a:p>
+            <a:r>
+              <a:rPr lang="en-US" sz="2400" dirty="0" err="1" smtClean="0"/>
+              <a:t>Bitbucket</a:t>
+            </a:r>
+            <a:r>
+              <a:rPr lang="en-US" sz="2400" dirty="0" smtClean="0"/>
+              <a:t>, Google Code</a:t>
+            </a:r>
+            <a:endParaRPr lang="en-US" sz="2400" dirty="0"/>
+          </a:p>
+        </p:txBody>
+      </p:sp>
     </p:spTree>
     <p:extLst>
       <p:ext uri="{BB962C8B-B14F-4D97-AF65-F5344CB8AC3E}">
-        <p14:creationId xmlns:p14="http://schemas.microsoft.com/office/powerpoint/2010/main" val="714236458"/>
+        <p14:creationId xmlns:p14="http://schemas.microsoft.com/office/powerpoint/2010/main" val="1300542451"/>
       </p:ext>
     </p:extLst>
   </p:cSld>
@@ -7110,6 +7147,390 @@
         </p:nvSpPr>
         <p:spPr>
           <a:xfrm>
+            <a:off x="-25658" y="-56378"/>
+            <a:ext cx="7931303" cy="646331"/>
+          </a:xfrm>
+          <a:prstGeom prst="rect">
+            <a:avLst/>
+          </a:prstGeom>
+          <a:noFill/>
+        </p:spPr>
+        <p:txBody>
+          <a:bodyPr wrap="none" rtlCol="0">
+            <a:spAutoFit/>
+          </a:bodyPr>
+          <a:lstStyle/>
+          <a:p>
+            <a:r>
+              <a:rPr lang="en-US" sz="3600" dirty="0" smtClean="0">
+                <a:solidFill>
+                  <a:srgbClr val="008000"/>
+                </a:solidFill>
+                <a:latin typeface="+mj-lt"/>
+              </a:rPr>
+              <a:t>Getting a handle on data: version control</a:t>
+            </a:r>
+            <a:endParaRPr lang="en-US" sz="3600" dirty="0">
+              <a:solidFill>
+                <a:srgbClr val="008000"/>
+              </a:solidFill>
+              <a:latin typeface="+mj-lt"/>
+            </a:endParaRPr>
+          </a:p>
+        </p:txBody>
+      </p:sp>
+      <p:pic>
+        <p:nvPicPr>
+          <p:cNvPr id="4" name="Picture 3" descr="BWAGit.png"/>
+          <p:cNvPicPr>
+            <a:picLocks noChangeAspect="1"/>
+          </p:cNvPicPr>
+          <p:nvPr/>
+        </p:nvPicPr>
+        <p:blipFill>
+          <a:blip r:embed="rId2">
+            <a:extLst>
+              <a:ext uri="{28A0092B-C50C-407E-A947-70E740481C1C}">
+                <a14:useLocalDpi xmlns:a14="http://schemas.microsoft.com/office/drawing/2010/main" val="0"/>
+              </a:ext>
+            </a:extLst>
+          </a:blip>
+          <a:stretch>
+            <a:fillRect/>
+          </a:stretch>
+        </p:blipFill>
+        <p:spPr>
+          <a:xfrm>
+            <a:off x="0" y="1333977"/>
+            <a:ext cx="9144000" cy="5148082"/>
+          </a:xfrm>
+          <a:prstGeom prst="rect">
+            <a:avLst/>
+          </a:prstGeom>
+        </p:spPr>
+      </p:pic>
+      <p:sp>
+        <p:nvSpPr>
+          <p:cNvPr id="5" name="TextBox 4"/>
+          <p:cNvSpPr txBox="1"/>
+          <p:nvPr/>
+        </p:nvSpPr>
+        <p:spPr>
+          <a:xfrm>
+            <a:off x="38490" y="6503635"/>
+            <a:ext cx="2835181" cy="369332"/>
+          </a:xfrm>
+          <a:prstGeom prst="rect">
+            <a:avLst/>
+          </a:prstGeom>
+          <a:noFill/>
+        </p:spPr>
+        <p:txBody>
+          <a:bodyPr wrap="none" rtlCol="0">
+            <a:spAutoFit/>
+          </a:bodyPr>
+          <a:lstStyle/>
+          <a:p>
+            <a:r>
+              <a:rPr lang="en-US" dirty="0" smtClean="0">
+                <a:solidFill>
+                  <a:srgbClr val="595959"/>
+                </a:solidFill>
+              </a:rPr>
+              <a:t>https://</a:t>
+            </a:r>
+            <a:r>
+              <a:rPr lang="en-US" dirty="0" err="1" smtClean="0">
+                <a:solidFill>
+                  <a:srgbClr val="595959"/>
+                </a:solidFill>
+              </a:rPr>
+              <a:t>github.com</a:t>
+            </a:r>
+            <a:r>
+              <a:rPr lang="en-US" dirty="0" smtClean="0">
+                <a:solidFill>
+                  <a:srgbClr val="595959"/>
+                </a:solidFill>
+              </a:rPr>
+              <a:t>/lh3/</a:t>
+            </a:r>
+            <a:r>
+              <a:rPr lang="en-US" dirty="0" err="1" smtClean="0">
+                <a:solidFill>
+                  <a:srgbClr val="595959"/>
+                </a:solidFill>
+              </a:rPr>
+              <a:t>bwa</a:t>
+            </a:r>
+            <a:endParaRPr lang="en-US" dirty="0">
+              <a:solidFill>
+                <a:srgbClr val="595959"/>
+              </a:solidFill>
+            </a:endParaRPr>
+          </a:p>
+        </p:txBody>
+      </p:sp>
+      <p:sp>
+        <p:nvSpPr>
+          <p:cNvPr id="6" name="TextBox 5"/>
+          <p:cNvSpPr txBox="1"/>
+          <p:nvPr/>
+        </p:nvSpPr>
+        <p:spPr>
+          <a:xfrm>
+            <a:off x="12831" y="718342"/>
+            <a:ext cx="2538801" cy="523220"/>
+          </a:xfrm>
+          <a:prstGeom prst="rect">
+            <a:avLst/>
+          </a:prstGeom>
+          <a:noFill/>
+        </p:spPr>
+        <p:txBody>
+          <a:bodyPr wrap="none" rtlCol="0">
+            <a:spAutoFit/>
+          </a:bodyPr>
+          <a:lstStyle/>
+          <a:p>
+            <a:r>
+              <a:rPr lang="en-US" sz="2800" dirty="0" err="1" smtClean="0"/>
+              <a:t>GitHub</a:t>
+            </a:r>
+            <a:r>
+              <a:rPr lang="en-US" sz="2800" dirty="0" smtClean="0"/>
+              <a:t> example</a:t>
+            </a:r>
+            <a:endParaRPr lang="en-US" sz="2800" dirty="0"/>
+          </a:p>
+        </p:txBody>
+      </p:sp>
+    </p:spTree>
+    <p:extLst>
+      <p:ext uri="{BB962C8B-B14F-4D97-AF65-F5344CB8AC3E}">
+        <p14:creationId xmlns:p14="http://schemas.microsoft.com/office/powerpoint/2010/main" val="4100079500"/>
+      </p:ext>
+    </p:extLst>
+  </p:cSld>
+  <p:clrMapOvr>
+    <a:masterClrMapping/>
+  </p:clrMapOvr>
+</p:sld>
+</file>
+
+<file path=ppt/slides/slide13.xml><?xml version="1.0" encoding="utf-8"?>
+<p:sld xmlns:a="http://schemas.openxmlformats.org/drawingml/2006/main" xmlns:r="http://schemas.openxmlformats.org/officeDocument/2006/relationships" xmlns:p="http://schemas.openxmlformats.org/presentationml/2006/main">
+  <p:cSld>
+    <p:spTree>
+      <p:nvGrpSpPr>
+        <p:cNvPr id="1" name=""/>
+        <p:cNvGrpSpPr/>
+        <p:nvPr/>
+      </p:nvGrpSpPr>
+      <p:grpSpPr>
+        <a:xfrm>
+          <a:off x="0" y="0"/>
+          <a:ext cx="0" cy="0"/>
+          <a:chOff x="0" y="0"/>
+          <a:chExt cx="0" cy="0"/>
+        </a:xfrm>
+      </p:grpSpPr>
+      <p:sp>
+        <p:nvSpPr>
+          <p:cNvPr id="2" name="TextBox 1"/>
+          <p:cNvSpPr txBox="1"/>
+          <p:nvPr/>
+        </p:nvSpPr>
+        <p:spPr>
+          <a:xfrm>
+            <a:off x="-25658" y="-82034"/>
+            <a:ext cx="4574991" cy="646331"/>
+          </a:xfrm>
+          <a:prstGeom prst="rect">
+            <a:avLst/>
+          </a:prstGeom>
+          <a:noFill/>
+        </p:spPr>
+        <p:txBody>
+          <a:bodyPr wrap="none" rtlCol="0">
+            <a:spAutoFit/>
+          </a:bodyPr>
+          <a:lstStyle/>
+          <a:p>
+            <a:r>
+              <a:rPr lang="en-US" sz="3600" dirty="0" smtClean="0">
+                <a:solidFill>
+                  <a:srgbClr val="008000"/>
+                </a:solidFill>
+                <a:latin typeface="+mj-lt"/>
+              </a:rPr>
+              <a:t>Data citing and sharing</a:t>
+            </a:r>
+            <a:endParaRPr lang="en-US" sz="3600" dirty="0">
+              <a:solidFill>
+                <a:srgbClr val="008000"/>
+              </a:solidFill>
+              <a:latin typeface="+mj-lt"/>
+            </a:endParaRPr>
+          </a:p>
+        </p:txBody>
+      </p:sp>
+      <p:sp>
+        <p:nvSpPr>
+          <p:cNvPr id="3" name="TextBox 2"/>
+          <p:cNvSpPr txBox="1"/>
+          <p:nvPr/>
+        </p:nvSpPr>
+        <p:spPr>
+          <a:xfrm>
+            <a:off x="-25656" y="756826"/>
+            <a:ext cx="2729909" cy="523220"/>
+          </a:xfrm>
+          <a:prstGeom prst="rect">
+            <a:avLst/>
+          </a:prstGeom>
+          <a:noFill/>
+        </p:spPr>
+        <p:txBody>
+          <a:bodyPr wrap="none" rtlCol="0">
+            <a:spAutoFit/>
+          </a:bodyPr>
+          <a:lstStyle/>
+          <a:p>
+            <a:r>
+              <a:rPr lang="en-US" sz="2800" dirty="0" err="1" smtClean="0"/>
+              <a:t>Figshare</a:t>
+            </a:r>
+            <a:r>
+              <a:rPr lang="en-US" sz="2800" dirty="0" smtClean="0"/>
+              <a:t> example</a:t>
+            </a:r>
+            <a:endParaRPr lang="en-US" sz="2800" dirty="0"/>
+          </a:p>
+        </p:txBody>
+      </p:sp>
+      <p:pic>
+        <p:nvPicPr>
+          <p:cNvPr id="4" name="Picture 3" descr="FigshareHome.png"/>
+          <p:cNvPicPr>
+            <a:picLocks noChangeAspect="1"/>
+          </p:cNvPicPr>
+          <p:nvPr/>
+        </p:nvPicPr>
+        <p:blipFill>
+          <a:blip r:embed="rId2">
+            <a:extLst>
+              <a:ext uri="{28A0092B-C50C-407E-A947-70E740481C1C}">
+                <a14:useLocalDpi xmlns:a14="http://schemas.microsoft.com/office/drawing/2010/main" val="0"/>
+              </a:ext>
+            </a:extLst>
+          </a:blip>
+          <a:stretch>
+            <a:fillRect/>
+          </a:stretch>
+        </p:blipFill>
+        <p:spPr>
+          <a:xfrm>
+            <a:off x="12831" y="1267218"/>
+            <a:ext cx="9144000" cy="5274849"/>
+          </a:xfrm>
+          <a:prstGeom prst="rect">
+            <a:avLst/>
+          </a:prstGeom>
+        </p:spPr>
+      </p:pic>
+      <p:sp>
+        <p:nvSpPr>
+          <p:cNvPr id="5" name="TextBox 4"/>
+          <p:cNvSpPr txBox="1"/>
+          <p:nvPr/>
+        </p:nvSpPr>
+        <p:spPr>
+          <a:xfrm>
+            <a:off x="38490" y="6503635"/>
+            <a:ext cx="2755607" cy="369332"/>
+          </a:xfrm>
+          <a:prstGeom prst="rect">
+            <a:avLst/>
+          </a:prstGeom>
+          <a:noFill/>
+        </p:spPr>
+        <p:txBody>
+          <a:bodyPr wrap="none" rtlCol="0">
+            <a:spAutoFit/>
+          </a:bodyPr>
+          <a:lstStyle/>
+          <a:p>
+            <a:r>
+              <a:rPr lang="en-US" dirty="0" smtClean="0">
+                <a:solidFill>
+                  <a:srgbClr val="595959"/>
+                </a:solidFill>
+              </a:rPr>
+              <a:t>https://</a:t>
+            </a:r>
+            <a:r>
+              <a:rPr lang="en-US" dirty="0" err="1" smtClean="0">
+                <a:solidFill>
+                  <a:srgbClr val="595959"/>
+                </a:solidFill>
+              </a:rPr>
+              <a:t>figshare.com</a:t>
+            </a:r>
+            <a:r>
+              <a:rPr lang="en-US" dirty="0" smtClean="0">
+                <a:solidFill>
+                  <a:srgbClr val="595959"/>
+                </a:solidFill>
+              </a:rPr>
+              <a:t>/about</a:t>
+            </a:r>
+            <a:endParaRPr lang="en-US" dirty="0">
+              <a:solidFill>
+                <a:srgbClr val="595959"/>
+              </a:solidFill>
+            </a:endParaRPr>
+          </a:p>
+        </p:txBody>
+      </p:sp>
+    </p:spTree>
+    <p:extLst>
+      <p:ext uri="{BB962C8B-B14F-4D97-AF65-F5344CB8AC3E}">
+        <p14:creationId xmlns:p14="http://schemas.microsoft.com/office/powerpoint/2010/main" val="714236458"/>
+      </p:ext>
+    </p:extLst>
+  </p:cSld>
+  <p:clrMapOvr>
+    <a:masterClrMapping/>
+  </p:clrMapOvr>
+</p:sld>
+</file>
+
+<file path=ppt/slides/slide14.xml><?xml version="1.0" encoding="utf-8"?>
+<p:sld xmlns:a="http://schemas.openxmlformats.org/drawingml/2006/main" xmlns:r="http://schemas.openxmlformats.org/officeDocument/2006/relationships" xmlns:p="http://schemas.openxmlformats.org/presentationml/2006/main">
+  <p:cSld>
+    <p:spTree>
+      <p:nvGrpSpPr>
+        <p:cNvPr id="1" name=""/>
+        <p:cNvGrpSpPr/>
+        <p:nvPr/>
+      </p:nvGrpSpPr>
+      <p:grpSpPr>
+        <a:xfrm>
+          <a:off x="0" y="0"/>
+          <a:ext cx="0" cy="0"/>
+          <a:chOff x="0" y="0"/>
+          <a:chExt cx="0" cy="0"/>
+        </a:xfrm>
+      </p:grpSpPr>
+      <p:sp>
+        <p:nvSpPr>
+          <p:cNvPr id="2" name="TextBox 1"/>
+          <p:cNvSpPr txBox="1"/>
+          <p:nvPr/>
+        </p:nvSpPr>
+        <p:spPr>
+          <a:xfrm>
             <a:off x="-25658" y="-43550"/>
             <a:ext cx="4574991" cy="646331"/>
           </a:xfrm>
@@ -7256,7 +7677,7 @@
 </p:sld>
 </file>
 
-<file path=ppt/slides/slide13.xml><?xml version="1.0" encoding="utf-8"?>
+<file path=ppt/slides/slide15.xml><?xml version="1.0" encoding="utf-8"?>
 <p:sld xmlns:a="http://schemas.openxmlformats.org/drawingml/2006/main" xmlns:r="http://schemas.openxmlformats.org/officeDocument/2006/relationships" xmlns:p="http://schemas.openxmlformats.org/presentationml/2006/main">
   <p:cSld>
     <p:spTree>
@@ -7632,7 +8053,7 @@
 </p:sld>
 </file>
 
-<file path=ppt/slides/slide14.xml><?xml version="1.0" encoding="utf-8"?>
+<file path=ppt/slides/slide16.xml><?xml version="1.0" encoding="utf-8"?>
 <p:sld xmlns:a="http://schemas.openxmlformats.org/drawingml/2006/main" xmlns:r="http://schemas.openxmlformats.org/officeDocument/2006/relationships" xmlns:p="http://schemas.openxmlformats.org/presentationml/2006/main">
   <p:cSld>
     <p:spTree>
@@ -8360,7 +8781,7 @@
 </p:sld>
 </file>
 
-<file path=ppt/slides/slide15.xml><?xml version="1.0" encoding="utf-8"?>
+<file path=ppt/slides/slide17.xml><?xml version="1.0" encoding="utf-8"?>
 <p:sld xmlns:a="http://schemas.openxmlformats.org/drawingml/2006/main" xmlns:r="http://schemas.openxmlformats.org/officeDocument/2006/relationships" xmlns:p="http://schemas.openxmlformats.org/presentationml/2006/main">
   <p:cSld>
     <p:spTree>
@@ -9247,16 +9668,40 @@
           <a:chExt cx="0" cy="0"/>
         </a:xfrm>
       </p:grpSpPr>
-      <p:sp>
-        <p:nvSpPr>
-          <p:cNvPr id="2" name="TextBox 1"/>
+      <p:pic>
+        <p:nvPicPr>
+          <p:cNvPr id="2" name="Picture 1"/>
+          <p:cNvPicPr>
+            <a:picLocks noChangeAspect="1"/>
+          </p:cNvPicPr>
+          <p:nvPr/>
+        </p:nvPicPr>
+        <p:blipFill>
+          <a:blip r:embed="rId2"/>
+          <a:stretch>
+            <a:fillRect/>
+          </a:stretch>
+        </p:blipFill>
+        <p:spPr>
+          <a:xfrm>
+            <a:off x="0" y="254000"/>
+            <a:ext cx="9144000" cy="6330462"/>
+          </a:xfrm>
+          <a:prstGeom prst="rect">
+            <a:avLst/>
+          </a:prstGeom>
+        </p:spPr>
+      </p:pic>
+      <p:sp>
+        <p:nvSpPr>
+          <p:cNvPr id="3" name="TextBox 2"/>
           <p:cNvSpPr txBox="1"/>
           <p:nvPr/>
         </p:nvSpPr>
         <p:spPr>
           <a:xfrm>
-            <a:off x="-51316" y="-61501"/>
-            <a:ext cx="6157004" cy="646331"/>
+            <a:off x="-51316" y="-138469"/>
+            <a:ext cx="1997512" cy="646331"/>
           </a:xfrm>
           <a:prstGeom prst="rect">
             <a:avLst/>
@@ -9269,6 +9714,15 @@
           </a:bodyPr>
           <a:lstStyle/>
           <a:p>
+            <a:r>
+              <a:rPr lang="en-US" sz="3600" dirty="0">
+                <a:solidFill>
+                  <a:srgbClr val="008000"/>
+                </a:solidFill>
+                <a:latin typeface="+mj-lt"/>
+              </a:rPr>
+              <a:t>P</a:t>
+            </a:r>
             <a:r>
               <a:rPr lang="en-US" sz="3600" dirty="0" smtClean="0">
                 <a:solidFill>
@@ -9276,7 +9730,181 @@
                 </a:solidFill>
                 <a:latin typeface="+mj-lt"/>
               </a:rPr>
-              <a:t>Electronic protocols: workflows</a:t>
+              <a:t>rotocols</a:t>
+            </a:r>
+            <a:endParaRPr lang="en-US" sz="3600" dirty="0">
+              <a:solidFill>
+                <a:srgbClr val="008000"/>
+              </a:solidFill>
+              <a:latin typeface="+mj-lt"/>
+            </a:endParaRPr>
+          </a:p>
+        </p:txBody>
+      </p:sp>
+      <p:sp>
+        <p:nvSpPr>
+          <p:cNvPr id="4" name="Rectangle 3"/>
+          <p:cNvSpPr/>
+          <p:nvPr/>
+        </p:nvSpPr>
+        <p:spPr>
+          <a:xfrm>
+            <a:off x="-1" y="6475840"/>
+            <a:ext cx="6324788" cy="400110"/>
+          </a:xfrm>
+          <a:prstGeom prst="rect">
+            <a:avLst/>
+          </a:prstGeom>
+        </p:spPr>
+        <p:txBody>
+          <a:bodyPr wrap="square">
+            <a:spAutoFit/>
+          </a:bodyPr>
+          <a:lstStyle/>
+          <a:p>
+            <a:r>
+              <a:rPr lang="en-US" sz="2000" dirty="0">
+                <a:solidFill>
+                  <a:srgbClr val="0000FF"/>
+                </a:solidFill>
+              </a:rPr>
+              <a:t>http://</a:t>
+            </a:r>
+            <a:r>
+              <a:rPr lang="en-US" sz="2000" dirty="0" err="1">
+                <a:solidFill>
+                  <a:srgbClr val="0000FF"/>
+                </a:solidFill>
+              </a:rPr>
+              <a:t>www.its.caltech.edu</a:t>
+            </a:r>
+            <a:r>
+              <a:rPr lang="en-US" sz="2000" dirty="0">
+                <a:solidFill>
+                  <a:srgbClr val="0000FF"/>
+                </a:solidFill>
+              </a:rPr>
+              <a:t>/~</a:t>
+            </a:r>
+            <a:r>
+              <a:rPr lang="en-US" sz="2000" dirty="0" err="1">
+                <a:solidFill>
+                  <a:srgbClr val="0000FF"/>
+                </a:solidFill>
+              </a:rPr>
+              <a:t>bjorker</a:t>
+            </a:r>
+            <a:r>
+              <a:rPr lang="en-US" sz="2000" dirty="0">
+                <a:solidFill>
+                  <a:srgbClr val="0000FF"/>
+                </a:solidFill>
+              </a:rPr>
+              <a:t>/</a:t>
+            </a:r>
+            <a:r>
+              <a:rPr lang="en-US" sz="2000" dirty="0" err="1">
+                <a:solidFill>
+                  <a:srgbClr val="0000FF"/>
+                </a:solidFill>
+              </a:rPr>
+              <a:t>protocols.html</a:t>
+            </a:r>
+            <a:endParaRPr lang="en-US" sz="2000" dirty="0">
+              <a:solidFill>
+                <a:srgbClr val="0000FF"/>
+              </a:solidFill>
+            </a:endParaRPr>
+          </a:p>
+        </p:txBody>
+      </p:sp>
+    </p:spTree>
+    <p:extLst>
+      <p:ext uri="{BB962C8B-B14F-4D97-AF65-F5344CB8AC3E}">
+        <p14:creationId xmlns:p14="http://schemas.microsoft.com/office/powerpoint/2010/main" val="1411082027"/>
+      </p:ext>
+    </p:extLst>
+  </p:cSld>
+  <p:clrMapOvr>
+    <a:masterClrMapping/>
+  </p:clrMapOvr>
+</p:sld>
+</file>
+
+<file path=ppt/slides/slide5.xml><?xml version="1.0" encoding="utf-8"?>
+<p:sld xmlns:a="http://schemas.openxmlformats.org/drawingml/2006/main" xmlns:r="http://schemas.openxmlformats.org/officeDocument/2006/relationships" xmlns:p="http://schemas.openxmlformats.org/presentationml/2006/main">
+  <p:cSld>
+    <p:spTree>
+      <p:nvGrpSpPr>
+        <p:cNvPr id="1" name=""/>
+        <p:cNvGrpSpPr/>
+        <p:nvPr/>
+      </p:nvGrpSpPr>
+      <p:grpSpPr>
+        <a:xfrm>
+          <a:off x="0" y="0"/>
+          <a:ext cx="0" cy="0"/>
+          <a:chOff x="0" y="0"/>
+          <a:chExt cx="0" cy="0"/>
+        </a:xfrm>
+      </p:grpSpPr>
+      <p:sp>
+        <p:nvSpPr>
+          <p:cNvPr id="2" name="TextBox 1"/>
+          <p:cNvSpPr txBox="1"/>
+          <p:nvPr/>
+        </p:nvSpPr>
+        <p:spPr>
+          <a:xfrm>
+            <a:off x="-51316" y="-61501"/>
+            <a:ext cx="6150467" cy="646331"/>
+          </a:xfrm>
+          <a:prstGeom prst="rect">
+            <a:avLst/>
+          </a:prstGeom>
+          <a:noFill/>
+        </p:spPr>
+        <p:txBody>
+          <a:bodyPr wrap="none" rtlCol="0">
+            <a:spAutoFit/>
+          </a:bodyPr>
+          <a:lstStyle/>
+          <a:p>
+            <a:r>
+              <a:rPr lang="en-US" sz="3600" dirty="0">
+                <a:solidFill>
+                  <a:srgbClr val="008000"/>
+                </a:solidFill>
+                <a:latin typeface="+mj-lt"/>
+              </a:rPr>
+              <a:t>P</a:t>
+            </a:r>
+            <a:r>
+              <a:rPr lang="en-US" sz="3600" dirty="0" smtClean="0">
+                <a:solidFill>
+                  <a:srgbClr val="008000"/>
+                </a:solidFill>
+                <a:latin typeface="+mj-lt"/>
+              </a:rPr>
+              <a:t>rotocols</a:t>
+            </a:r>
+            <a:r>
+              <a:rPr lang="en-US" sz="3600" dirty="0" smtClean="0">
+                <a:solidFill>
+                  <a:srgbClr val="008000"/>
+                </a:solidFill>
+                <a:latin typeface="+mj-lt"/>
+              </a:rPr>
+              <a:t>: </a:t>
+            </a:r>
+            <a:r>
+              <a:rPr lang="en-US" sz="3600" dirty="0" smtClean="0">
+                <a:solidFill>
+                  <a:srgbClr val="008000"/>
+                </a:solidFill>
+                <a:latin typeface="+mj-lt"/>
+              </a:rPr>
+              <a:t>electronic workflows</a:t>
             </a:r>
             <a:endParaRPr lang="en-US" sz="3600" dirty="0">
               <a:solidFill>
@@ -9392,7 +10020,7 @@
 </p:sld>
 </file>
 
-<file path=ppt/slides/slide5.xml><?xml version="1.0" encoding="utf-8"?>
+<file path=ppt/slides/slide6.xml><?xml version="1.0" encoding="utf-8"?>
 <p:sld xmlns:a="http://schemas.openxmlformats.org/drawingml/2006/main" xmlns:r="http://schemas.openxmlformats.org/officeDocument/2006/relationships" xmlns:p="http://schemas.openxmlformats.org/presentationml/2006/main">
   <p:cSld>
     <p:spTree>
@@ -9559,7 +10187,7 @@
 </p:sld>
 </file>
 
-<file path=ppt/slides/slide6.xml><?xml version="1.0" encoding="utf-8"?>
+<file path=ppt/slides/slide7.xml><?xml version="1.0" encoding="utf-8"?>
 <p:sld xmlns:a="http://schemas.openxmlformats.org/drawingml/2006/main" xmlns:r="http://schemas.openxmlformats.org/officeDocument/2006/relationships" xmlns:p="http://schemas.openxmlformats.org/presentationml/2006/main">
   <p:cSld>
     <p:spTree>
@@ -9722,10 +10350,17 @@
   <p:clrMapOvr>
     <a:masterClrMapping/>
   </p:clrMapOvr>
+  <p:timing>
+    <p:tnLst>
+      <p:par>
+        <p:cTn xmlns:p14="http://schemas.microsoft.com/office/powerpoint/2010/main" id="1" dur="indefinite" restart="never" nodeType="tmRoot"/>
+      </p:par>
+    </p:tnLst>
+  </p:timing>
 </p:sld>
 </file>
 
-<file path=ppt/slides/slide7.xml><?xml version="1.0" encoding="utf-8"?>
+<file path=ppt/slides/slide8.xml><?xml version="1.0" encoding="utf-8"?>
 <p:sld xmlns:a="http://schemas.openxmlformats.org/drawingml/2006/main" xmlns:r="http://schemas.openxmlformats.org/officeDocument/2006/relationships" xmlns:p="http://schemas.openxmlformats.org/presentationml/2006/main">
   <p:cSld>
     <p:spTree>
@@ -9846,136 +10481,6 @@
     <p:extLst>
       <p:ext uri="{BB962C8B-B14F-4D97-AF65-F5344CB8AC3E}">
         <p14:creationId xmlns:p14="http://schemas.microsoft.com/office/powerpoint/2010/main" val="258730931"/>
-      </p:ext>
-    </p:extLst>
-  </p:cSld>
-  <p:clrMapOvr>
-    <a:masterClrMapping/>
-  </p:clrMapOvr>
-</p:sld>
-</file>
-
-<file path=ppt/slides/slide8.xml><?xml version="1.0" encoding="utf-8"?>
-<p:sld xmlns:a="http://schemas.openxmlformats.org/drawingml/2006/main" xmlns:r="http://schemas.openxmlformats.org/officeDocument/2006/relationships" xmlns:p="http://schemas.openxmlformats.org/presentationml/2006/main">
-  <p:cSld>
-    <p:spTree>
-      <p:nvGrpSpPr>
-        <p:cNvPr id="1" name=""/>
-        <p:cNvGrpSpPr/>
-        <p:nvPr/>
-      </p:nvGrpSpPr>
-      <p:grpSpPr>
-        <a:xfrm>
-          <a:off x="0" y="0"/>
-          <a:ext cx="0" cy="0"/>
-          <a:chOff x="0" y="0"/>
-          <a:chExt cx="0" cy="0"/>
-        </a:xfrm>
-      </p:grpSpPr>
-      <p:sp>
-        <p:nvSpPr>
-          <p:cNvPr id="2" name="TextBox 1"/>
-          <p:cNvSpPr txBox="1"/>
-          <p:nvPr/>
-        </p:nvSpPr>
-        <p:spPr>
-          <a:xfrm>
-            <a:off x="-25658" y="-43550"/>
-            <a:ext cx="7931303" cy="646331"/>
-          </a:xfrm>
-          <a:prstGeom prst="rect">
-            <a:avLst/>
-          </a:prstGeom>
-          <a:noFill/>
-        </p:spPr>
-        <p:txBody>
-          <a:bodyPr wrap="none" rtlCol="0">
-            <a:spAutoFit/>
-          </a:bodyPr>
-          <a:lstStyle/>
-          <a:p>
-            <a:r>
-              <a:rPr lang="en-US" sz="3600" dirty="0" smtClean="0">
-                <a:solidFill>
-                  <a:srgbClr val="008000"/>
-                </a:solidFill>
-                <a:latin typeface="+mj-lt"/>
-              </a:rPr>
-              <a:t>Getting a handle on data: version control</a:t>
-            </a:r>
-            <a:endParaRPr lang="en-US" sz="3600" dirty="0">
-              <a:solidFill>
-                <a:srgbClr val="008000"/>
-              </a:solidFill>
-              <a:latin typeface="+mj-lt"/>
-            </a:endParaRPr>
-          </a:p>
-        </p:txBody>
-      </p:sp>
-      <p:sp>
-        <p:nvSpPr>
-          <p:cNvPr id="3" name="TextBox 2"/>
-          <p:cNvSpPr txBox="1"/>
-          <p:nvPr/>
-        </p:nvSpPr>
-        <p:spPr>
-          <a:xfrm>
-            <a:off x="2" y="808138"/>
-            <a:ext cx="2109071" cy="523220"/>
-          </a:xfrm>
-          <a:prstGeom prst="rect">
-            <a:avLst/>
-          </a:prstGeom>
-          <a:noFill/>
-        </p:spPr>
-        <p:txBody>
-          <a:bodyPr wrap="none" rtlCol="0">
-            <a:spAutoFit/>
-          </a:bodyPr>
-          <a:lstStyle/>
-          <a:p>
-            <a:r>
-              <a:rPr lang="en-US" sz="2800" dirty="0" smtClean="0"/>
-              <a:t>SVN example</a:t>
-            </a:r>
-            <a:endParaRPr lang="en-US" sz="2800" dirty="0"/>
-          </a:p>
-        </p:txBody>
-      </p:sp>
-      <p:pic>
-        <p:nvPicPr>
-          <p:cNvPr id="6" name="Picture 5" descr="SVNScriptDetails.png"/>
-          <p:cNvPicPr>
-            <a:picLocks noChangeAspect="1"/>
-          </p:cNvPicPr>
-          <p:nvPr/>
-        </p:nvPicPr>
-        <p:blipFill>
-          <a:blip r:embed="rId2">
-            <a:extLst>
-              <a:ext uri="{28A0092B-C50C-407E-A947-70E740481C1C}">
-                <a14:useLocalDpi xmlns:a14="http://schemas.microsoft.com/office/drawing/2010/main" val="0"/>
-              </a:ext>
-            </a:extLst>
-          </a:blip>
-          <a:stretch>
-            <a:fillRect/>
-          </a:stretch>
-        </p:blipFill>
-        <p:spPr>
-          <a:xfrm>
-            <a:off x="2" y="1408326"/>
-            <a:ext cx="9144000" cy="5477618"/>
-          </a:xfrm>
-          <a:prstGeom prst="rect">
-            <a:avLst/>
-          </a:prstGeom>
-        </p:spPr>
-      </p:pic>
-    </p:spTree>
-    <p:extLst>
-      <p:ext uri="{BB962C8B-B14F-4D97-AF65-F5344CB8AC3E}">
-        <p14:creationId xmlns:p14="http://schemas.microsoft.com/office/powerpoint/2010/main" val="3614144537"/>
       </p:ext>
     </p:extLst>
   </p:cSld>
@@ -10002,9 +10507,79 @@
           <a:chExt cx="0" cy="0"/>
         </a:xfrm>
       </p:grpSpPr>
+      <p:sp>
+        <p:nvSpPr>
+          <p:cNvPr id="2" name="TextBox 1"/>
+          <p:cNvSpPr txBox="1"/>
+          <p:nvPr/>
+        </p:nvSpPr>
+        <p:spPr>
+          <a:xfrm>
+            <a:off x="-25658" y="-43550"/>
+            <a:ext cx="7931303" cy="646331"/>
+          </a:xfrm>
+          <a:prstGeom prst="rect">
+            <a:avLst/>
+          </a:prstGeom>
+          <a:noFill/>
+        </p:spPr>
+        <p:txBody>
+          <a:bodyPr wrap="none" rtlCol="0">
+            <a:spAutoFit/>
+          </a:bodyPr>
+          <a:lstStyle/>
+          <a:p>
+            <a:r>
+              <a:rPr lang="en-US" sz="3600" dirty="0" smtClean="0">
+                <a:solidFill>
+                  <a:srgbClr val="008000"/>
+                </a:solidFill>
+                <a:latin typeface="+mj-lt"/>
+              </a:rPr>
+              <a:t>Getting a handle on data: version control</a:t>
+            </a:r>
+            <a:endParaRPr lang="en-US" sz="3600" dirty="0">
+              <a:solidFill>
+                <a:srgbClr val="008000"/>
+              </a:solidFill>
+              <a:latin typeface="+mj-lt"/>
+            </a:endParaRPr>
+          </a:p>
+        </p:txBody>
+      </p:sp>
+      <p:sp>
+        <p:nvSpPr>
+          <p:cNvPr id="3" name="TextBox 2"/>
+          <p:cNvSpPr txBox="1"/>
+          <p:nvPr/>
+        </p:nvSpPr>
+        <p:spPr>
+          <a:xfrm>
+            <a:off x="2" y="808138"/>
+            <a:ext cx="2109071" cy="523220"/>
+          </a:xfrm>
+          <a:prstGeom prst="rect">
+            <a:avLst/>
+          </a:prstGeom>
+          <a:noFill/>
+        </p:spPr>
+        <p:txBody>
+          <a:bodyPr wrap="none" rtlCol="0">
+            <a:spAutoFit/>
+          </a:bodyPr>
+          <a:lstStyle/>
+          <a:p>
+            <a:r>
+              <a:rPr lang="en-US" sz="2800" dirty="0" smtClean="0"/>
+              <a:t>SVN example</a:t>
+            </a:r>
+            <a:endParaRPr lang="en-US" sz="2800" dirty="0"/>
+          </a:p>
+        </p:txBody>
+      </p:sp>
       <p:pic>
         <p:nvPicPr>
-          <p:cNvPr id="2" name="Picture 1" descr="HengLiGit.png"/>
+          <p:cNvPr id="6" name="Picture 5" descr="SVNScriptDetails.png"/>
           <p:cNvPicPr>
             <a:picLocks noChangeAspect="1"/>
           </p:cNvPicPr>
@@ -10024,146 +10599,18 @@
         </p:blipFill>
         <p:spPr>
           <a:xfrm>
-            <a:off x="0" y="1325408"/>
-            <a:ext cx="9144000" cy="5119389"/>
+            <a:off x="2" y="1408326"/>
+            <a:ext cx="9144000" cy="5477618"/>
           </a:xfrm>
           <a:prstGeom prst="rect">
             <a:avLst/>
           </a:prstGeom>
         </p:spPr>
       </p:pic>
-      <p:sp>
-        <p:nvSpPr>
-          <p:cNvPr id="3" name="TextBox 2"/>
-          <p:cNvSpPr txBox="1"/>
-          <p:nvPr/>
-        </p:nvSpPr>
-        <p:spPr>
-          <a:xfrm>
-            <a:off x="0" y="6501496"/>
-            <a:ext cx="2108670" cy="338554"/>
-          </a:xfrm>
-          <a:prstGeom prst="rect">
-            <a:avLst/>
-          </a:prstGeom>
-          <a:noFill/>
-        </p:spPr>
-        <p:txBody>
-          <a:bodyPr wrap="none" rtlCol="0">
-            <a:spAutoFit/>
-          </a:bodyPr>
-          <a:lstStyle/>
-          <a:p>
-            <a:r>
-              <a:rPr lang="en-US" sz="1600" dirty="0" smtClean="0">
-                <a:solidFill>
-                  <a:srgbClr val="595959"/>
-                </a:solidFill>
-              </a:rPr>
-              <a:t>https://</a:t>
-            </a:r>
-            <a:r>
-              <a:rPr lang="en-US" sz="1600" dirty="0" err="1" smtClean="0">
-                <a:solidFill>
-                  <a:srgbClr val="595959"/>
-                </a:solidFill>
-              </a:rPr>
-              <a:t>github.com</a:t>
-            </a:r>
-            <a:r>
-              <a:rPr lang="en-US" sz="1600" dirty="0" smtClean="0">
-                <a:solidFill>
-                  <a:srgbClr val="595959"/>
-                </a:solidFill>
-              </a:rPr>
-              <a:t>/lh3</a:t>
-            </a:r>
-            <a:endParaRPr lang="en-US" sz="1600" dirty="0">
-              <a:solidFill>
-                <a:srgbClr val="595959"/>
-              </a:solidFill>
-            </a:endParaRPr>
-          </a:p>
-        </p:txBody>
-      </p:sp>
-      <p:sp>
-        <p:nvSpPr>
-          <p:cNvPr id="4" name="TextBox 3"/>
-          <p:cNvSpPr txBox="1"/>
-          <p:nvPr/>
-        </p:nvSpPr>
-        <p:spPr>
-          <a:xfrm>
-            <a:off x="-25658" y="-82034"/>
-            <a:ext cx="7931303" cy="646331"/>
-          </a:xfrm>
-          <a:prstGeom prst="rect">
-            <a:avLst/>
-          </a:prstGeom>
-          <a:noFill/>
-        </p:spPr>
-        <p:txBody>
-          <a:bodyPr wrap="none" rtlCol="0">
-            <a:spAutoFit/>
-          </a:bodyPr>
-          <a:lstStyle/>
-          <a:p>
-            <a:r>
-              <a:rPr lang="en-US" sz="3600" dirty="0" smtClean="0">
-                <a:solidFill>
-                  <a:srgbClr val="008000"/>
-                </a:solidFill>
-                <a:latin typeface="+mj-lt"/>
-              </a:rPr>
-              <a:t>Getting a handle on data: version control</a:t>
-            </a:r>
-            <a:endParaRPr lang="en-US" sz="3600" dirty="0">
-              <a:solidFill>
-                <a:srgbClr val="008000"/>
-              </a:solidFill>
-              <a:latin typeface="+mj-lt"/>
-            </a:endParaRPr>
-          </a:p>
-        </p:txBody>
-      </p:sp>
-      <p:sp>
-        <p:nvSpPr>
-          <p:cNvPr id="5" name="TextBox 4"/>
-          <p:cNvSpPr txBox="1"/>
-          <p:nvPr/>
-        </p:nvSpPr>
-        <p:spPr>
-          <a:xfrm>
-            <a:off x="12831" y="756826"/>
-            <a:ext cx="2538801" cy="523220"/>
-          </a:xfrm>
-          <a:prstGeom prst="rect">
-            <a:avLst/>
-          </a:prstGeom>
-          <a:noFill/>
-        </p:spPr>
-        <p:txBody>
-          <a:bodyPr wrap="none" rtlCol="0">
-            <a:spAutoFit/>
-          </a:bodyPr>
-          <a:lstStyle/>
-          <a:p>
-            <a:r>
-              <a:rPr lang="en-US" sz="2800" dirty="0" err="1" smtClean="0"/>
-              <a:t>GitHub</a:t>
-            </a:r>
-            <a:r>
-              <a:rPr lang="en-US" sz="2800" dirty="0" smtClean="0"/>
-              <a:t> example</a:t>
-            </a:r>
-            <a:endParaRPr lang="en-US" sz="2800" dirty="0"/>
-          </a:p>
-        </p:txBody>
-      </p:sp>
     </p:spTree>
     <p:extLst>
       <p:ext uri="{BB962C8B-B14F-4D97-AF65-F5344CB8AC3E}">
-        <p14:creationId xmlns:p14="http://schemas.microsoft.com/office/powerpoint/2010/main" val="1300542451"/>
+        <p14:creationId xmlns:p14="http://schemas.microsoft.com/office/powerpoint/2010/main" val="3614144537"/>
       </p:ext>
     </p:extLst>
   </p:cSld>

</xml_diff>